<commit_message>
First class and some documentation.
</commit_message>
<xml_diff>
--- a/docs/InformaçõesGerais.pptx
+++ b/docs/InformaçõesGerais.pptx
@@ -7,7 +7,10 @@
   <p:sldIdLst>
     <p:sldId id="257" r:id="rId3"/>
     <p:sldId id="259" r:id="rId4"/>
-    <p:sldId id="258" r:id="rId5"/>
+    <p:sldId id="263" r:id="rId5"/>
+    <p:sldId id="261" r:id="rId6"/>
+    <p:sldId id="262" r:id="rId7"/>
+    <p:sldId id="258" r:id="rId8"/>
   </p:sldIdLst>
   <p:sldSz cx="9144000" cy="6858000" type="screen4x3"/>
   <p:notesSz cx="6858000" cy="9144000"/>
@@ -3198,7 +3201,7 @@
             </a:r>
             <a:r>
               <a:rPr lang="pt-BR" dirty="0"/>
-              <a:t>atividades de avaliação serão divididas em três partes</a:t>
+              <a:t>atividades de avaliação serão divididas em quatro partes</a:t>
             </a:r>
             <a:r>
               <a:rPr lang="pt-BR" dirty="0" smtClean="0"/>
@@ -3207,50 +3210,25 @@
             <a:endParaRPr lang="pt-BR" dirty="0" smtClean="0"/>
           </a:p>
           <a:p>
-            <a:pPr marL="0" indent="0" algn="just">
-              <a:buNone/>
-            </a:pPr>
-            <a:endParaRPr lang="pt-BR" dirty="0"/>
-          </a:p>
-          <a:p>
-            <a:pPr marL="971550" lvl="1" indent="-514350" algn="just">
-              <a:buFont typeface="+mj-lt"/>
-              <a:buAutoNum type="arabicPeriod"/>
-            </a:pPr>
-            <a:r>
-              <a:rPr lang="pt-BR" sz="2000" dirty="0"/>
-              <a:t>presença e participação (10%)</a:t>
-            </a:r>
-            <a:endParaRPr lang="pt-BR" sz="2000" dirty="0" smtClean="0"/>
-          </a:p>
-          <a:p>
-            <a:pPr marL="971550" lvl="1" indent="-514350" algn="just">
-              <a:buFont typeface="+mj-lt"/>
-              <a:buAutoNum type="arabicPeriod"/>
-            </a:pPr>
-            <a:r>
-              <a:rPr lang="pt-BR" sz="2000" dirty="0" smtClean="0"/>
-              <a:t>planejamento, execução e relatório de laboratórios (40%)</a:t>
-            </a:r>
-            <a:endParaRPr lang="pt-BR" sz="2000" dirty="0" smtClean="0"/>
-          </a:p>
-          <a:p>
-            <a:pPr marL="971550" lvl="1" indent="-514350" algn="just">
-              <a:buFont typeface="+mj-lt"/>
-              <a:buAutoNum type="arabicPeriod"/>
-            </a:pPr>
-            <a:r>
-              <a:rPr lang="pt-BR" sz="2000" dirty="0" smtClean="0"/>
-              <a:t>projeto final de disciplina (50%)</a:t>
-            </a:r>
-            <a:endParaRPr lang="pt-BR" sz="2000" dirty="0"/>
-          </a:p>
-          <a:p>
             <a:pPr algn="just"/>
             <a:endParaRPr lang="pt-BR" dirty="0" smtClean="0"/>
           </a:p>
           <a:p>
             <a:pPr algn="just"/>
+            <a:endParaRPr lang="pt-BR" dirty="0" smtClean="0"/>
+          </a:p>
+          <a:p>
+            <a:pPr algn="just"/>
+            <a:endParaRPr lang="pt-BR" dirty="0" smtClean="0"/>
+          </a:p>
+          <a:p>
+            <a:pPr marL="0" indent="0" algn="just">
+              <a:buNone/>
+            </a:pPr>
+            <a:endParaRPr lang="pt-BR" dirty="0" smtClean="0"/>
+          </a:p>
+          <a:p>
+            <a:pPr algn="just"/>
             <a:r>
               <a:rPr lang="pt-BR" dirty="0" smtClean="0"/>
               <a:t>Aplicar-se-á </a:t>
@@ -3267,6 +3245,478 @@
           </a:p>
         </p:txBody>
       </p:sp>
+      <p:graphicFrame>
+        <p:nvGraphicFramePr>
+          <p:cNvPr id="7" name="Tabela 6"/>
+          <p:cNvGraphicFramePr/>
+          <p:nvPr/>
+        </p:nvGraphicFramePr>
+        <p:xfrm>
+          <a:off x="2536190" y="2983865"/>
+          <a:ext cx="4292600" cy="1463040"/>
+        </p:xfrm>
+        <a:graphic>
+          <a:graphicData uri="http://schemas.openxmlformats.org/drawingml/2006/table">
+            <a:tbl>
+              <a:tblPr firstRow="1" bandRow="1">
+                <a:tableStyleId>{5940675A-B579-460E-94D1-54222C63F5DA}</a:tableStyleId>
+              </a:tblPr>
+              <a:tblGrid>
+                <a:gridCol w="3442335"/>
+                <a:gridCol w="850265"/>
+              </a:tblGrid>
+              <a:tr h="365760">
+                <a:tc>
+                  <a:txBody>
+                    <a:bodyPr/>
+                    <a:p>
+                      <a:pPr indent="0">
+                        <a:buNone/>
+                      </a:pPr>
+                      <a:r>
+                        <a:rPr lang="en-US" sz="2400" b="0">
+                          <a:latin typeface="Calibri" panose="020F0502020204030204" charset="0"/>
+                          <a:cs typeface="Calibri" panose="020F0502020204030204" charset="0"/>
+                        </a:rPr>
+                        <a:t>Exercícios e atividades</a:t>
+                      </a:r>
+                      <a:endParaRPr lang="en-US" altLang="en-US" sz="2400" b="0">
+                        <a:latin typeface="Calibri" panose="020F0502020204030204" charset="0"/>
+                        <a:ea typeface="Calibri" panose="020F0502020204030204" charset="0"/>
+                        <a:cs typeface="Calibri" panose="020F0502020204030204" charset="0"/>
+                      </a:endParaRPr>
+                    </a:p>
+                  </a:txBody>
+                  <a:tcPr marL="68580" marR="68580" marT="0" marB="0" vert="horz" anchor="t" anchorCtr="0">
+                    <a:lnL w="19050">
+                      <a:solidFill>
+                        <a:schemeClr val="tx1"/>
+                      </a:solidFill>
+                      <a:prstDash val="solid"/>
+                    </a:lnL>
+                    <a:lnR w="19050">
+                      <a:solidFill>
+                        <a:schemeClr val="tx1"/>
+                      </a:solidFill>
+                      <a:prstDash val="solid"/>
+                    </a:lnR>
+                    <a:lnT w="19050">
+                      <a:solidFill>
+                        <a:schemeClr val="tx1"/>
+                      </a:solidFill>
+                      <a:prstDash val="solid"/>
+                    </a:lnT>
+                    <a:lnB w="19050">
+                      <a:solidFill>
+                        <a:schemeClr val="tx1"/>
+                      </a:solidFill>
+                      <a:prstDash val="solid"/>
+                    </a:lnB>
+                    <a:lnTlToBr>
+                      <a:noFill/>
+                    </a:lnTlToBr>
+                    <a:lnBlToTr>
+                      <a:noFill/>
+                    </a:lnBlToTr>
+                    <a:noFill/>
+                  </a:tcPr>
+                </a:tc>
+                <a:tc>
+                  <a:txBody>
+                    <a:bodyPr/>
+                    <a:p>
+                      <a:pPr indent="0" algn="ctr">
+                        <a:buNone/>
+                      </a:pPr>
+                      <a:r>
+                        <a:rPr lang="en-US" sz="2400" b="0">
+                          <a:latin typeface="Calibri" panose="020F0502020204030204" charset="0"/>
+                          <a:cs typeface="Calibri" panose="020F0502020204030204" charset="0"/>
+                        </a:rPr>
+                        <a:t>20%</a:t>
+                      </a:r>
+                      <a:endParaRPr lang="en-US" altLang="en-US" sz="2400" b="0">
+                        <a:latin typeface="Calibri" panose="020F0502020204030204" charset="0"/>
+                        <a:ea typeface="Calibri" panose="020F0502020204030204" charset="0"/>
+                        <a:cs typeface="Calibri" panose="020F0502020204030204" charset="0"/>
+                      </a:endParaRPr>
+                    </a:p>
+                  </a:txBody>
+                  <a:tcPr marL="68580" marR="68580" marT="0" marB="0" vert="horz" anchor="t" anchorCtr="0">
+                    <a:lnL w="19050">
+                      <a:solidFill>
+                        <a:schemeClr val="tx1"/>
+                      </a:solidFill>
+                      <a:prstDash val="solid"/>
+                    </a:lnL>
+                    <a:lnR w="19050">
+                      <a:solidFill>
+                        <a:schemeClr val="tx1"/>
+                      </a:solidFill>
+                      <a:prstDash val="solid"/>
+                    </a:lnR>
+                    <a:lnT w="19050">
+                      <a:solidFill>
+                        <a:schemeClr val="tx1"/>
+                      </a:solidFill>
+                      <a:prstDash val="solid"/>
+                    </a:lnT>
+                    <a:lnB w="19050">
+                      <a:solidFill>
+                        <a:schemeClr val="tx1"/>
+                      </a:solidFill>
+                      <a:prstDash val="solid"/>
+                    </a:lnB>
+                    <a:lnTlToBr>
+                      <a:noFill/>
+                    </a:lnTlToBr>
+                    <a:lnBlToTr>
+                      <a:noFill/>
+                    </a:lnBlToTr>
+                    <a:noFill/>
+                  </a:tcPr>
+                </a:tc>
+              </a:tr>
+              <a:tr h="365760">
+                <a:tc>
+                  <a:txBody>
+                    <a:bodyPr/>
+                    <a:p>
+                      <a:pPr indent="0">
+                        <a:buNone/>
+                      </a:pPr>
+                      <a:r>
+                        <a:rPr lang="en-US" sz="2400" b="0">
+                          <a:latin typeface="Calibri" panose="020F0502020204030204" charset="0"/>
+                          <a:cs typeface="Calibri" panose="020F0502020204030204" charset="0"/>
+                        </a:rPr>
+                        <a:t>Atividades de laboratório</a:t>
+                      </a:r>
+                      <a:endParaRPr lang="en-US" altLang="en-US" sz="2400" b="0">
+                        <a:latin typeface="Calibri" panose="020F0502020204030204" charset="0"/>
+                        <a:ea typeface="Calibri" panose="020F0502020204030204" charset="0"/>
+                        <a:cs typeface="Calibri" panose="020F0502020204030204" charset="0"/>
+                      </a:endParaRPr>
+                    </a:p>
+                  </a:txBody>
+                  <a:tcPr marL="68580" marR="68580" marT="0" marB="0" vert="horz" anchor="t" anchorCtr="0">
+                    <a:lnL w="19050">
+                      <a:solidFill>
+                        <a:schemeClr val="tx1"/>
+                      </a:solidFill>
+                      <a:prstDash val="solid"/>
+                    </a:lnL>
+                    <a:lnR w="19050">
+                      <a:solidFill>
+                        <a:schemeClr val="tx1"/>
+                      </a:solidFill>
+                      <a:prstDash val="solid"/>
+                    </a:lnR>
+                    <a:lnT w="19050">
+                      <a:solidFill>
+                        <a:schemeClr val="tx1"/>
+                      </a:solidFill>
+                      <a:prstDash val="solid"/>
+                    </a:lnT>
+                    <a:lnB w="19050">
+                      <a:solidFill>
+                        <a:schemeClr val="tx1"/>
+                      </a:solidFill>
+                      <a:prstDash val="solid"/>
+                    </a:lnB>
+                    <a:lnTlToBr>
+                      <a:noFill/>
+                    </a:lnTlToBr>
+                    <a:lnBlToTr>
+                      <a:noFill/>
+                    </a:lnBlToTr>
+                    <a:noFill/>
+                  </a:tcPr>
+                </a:tc>
+                <a:tc>
+                  <a:txBody>
+                    <a:bodyPr/>
+                    <a:p>
+                      <a:pPr indent="0" algn="ctr">
+                        <a:buNone/>
+                      </a:pPr>
+                      <a:r>
+                        <a:rPr lang="en-US" sz="2400" b="0">
+                          <a:latin typeface="Calibri" panose="020F0502020204030204" charset="0"/>
+                          <a:cs typeface="Calibri" panose="020F0502020204030204" charset="0"/>
+                        </a:rPr>
+                        <a:t>30%</a:t>
+                      </a:r>
+                      <a:endParaRPr lang="en-US" altLang="en-US" sz="2400" b="0">
+                        <a:latin typeface="Calibri" panose="020F0502020204030204" charset="0"/>
+                        <a:ea typeface="Calibri" panose="020F0502020204030204" charset="0"/>
+                        <a:cs typeface="Calibri" panose="020F0502020204030204" charset="0"/>
+                      </a:endParaRPr>
+                    </a:p>
+                  </a:txBody>
+                  <a:tcPr marL="68580" marR="68580" marT="0" marB="0" vert="horz" anchor="t" anchorCtr="0">
+                    <a:lnL w="19050">
+                      <a:solidFill>
+                        <a:schemeClr val="tx1"/>
+                      </a:solidFill>
+                      <a:prstDash val="solid"/>
+                    </a:lnL>
+                    <a:lnR w="19050">
+                      <a:solidFill>
+                        <a:schemeClr val="tx1"/>
+                      </a:solidFill>
+                      <a:prstDash val="solid"/>
+                    </a:lnR>
+                    <a:lnT w="19050">
+                      <a:solidFill>
+                        <a:schemeClr val="tx1"/>
+                      </a:solidFill>
+                      <a:prstDash val="solid"/>
+                    </a:lnT>
+                    <a:lnB w="19050">
+                      <a:solidFill>
+                        <a:schemeClr val="tx1"/>
+                      </a:solidFill>
+                      <a:prstDash val="solid"/>
+                    </a:lnB>
+                    <a:lnTlToBr>
+                      <a:noFill/>
+                    </a:lnTlToBr>
+                    <a:lnBlToTr>
+                      <a:noFill/>
+                    </a:lnBlToTr>
+                    <a:noFill/>
+                  </a:tcPr>
+                </a:tc>
+              </a:tr>
+              <a:tr h="201930">
+                <a:tc>
+                  <a:txBody>
+                    <a:bodyPr/>
+                    <a:p>
+                      <a:pPr indent="0">
+                        <a:buNone/>
+                      </a:pPr>
+                      <a:r>
+                        <a:rPr lang="en-US" sz="2400" b="0">
+                          <a:latin typeface="Calibri" panose="020F0502020204030204" charset="0"/>
+                          <a:cs typeface="Calibri" panose="020F0502020204030204" charset="0"/>
+                        </a:rPr>
+                        <a:t>Projeto de curso</a:t>
+                      </a:r>
+                      <a:endParaRPr lang="en-US" altLang="en-US" sz="2400" b="0">
+                        <a:latin typeface="Calibri" panose="020F0502020204030204" charset="0"/>
+                        <a:ea typeface="Calibri" panose="020F0502020204030204" charset="0"/>
+                        <a:cs typeface="Calibri" panose="020F0502020204030204" charset="0"/>
+                      </a:endParaRPr>
+                    </a:p>
+                  </a:txBody>
+                  <a:tcPr marL="68580" marR="68580" marT="0" marB="0" vert="horz" anchor="t" anchorCtr="0">
+                    <a:lnL w="19050">
+                      <a:solidFill>
+                        <a:schemeClr val="tx1"/>
+                      </a:solidFill>
+                      <a:prstDash val="solid"/>
+                    </a:lnL>
+                    <a:lnR w="19050">
+                      <a:solidFill>
+                        <a:schemeClr val="tx1"/>
+                      </a:solidFill>
+                      <a:prstDash val="solid"/>
+                    </a:lnR>
+                    <a:lnT w="19050">
+                      <a:solidFill>
+                        <a:schemeClr val="tx1"/>
+                      </a:solidFill>
+                      <a:prstDash val="solid"/>
+                    </a:lnT>
+                    <a:lnB w="19050">
+                      <a:solidFill>
+                        <a:schemeClr val="tx1"/>
+                      </a:solidFill>
+                      <a:prstDash val="solid"/>
+                    </a:lnB>
+                    <a:lnTlToBr>
+                      <a:noFill/>
+                    </a:lnTlToBr>
+                    <a:lnBlToTr>
+                      <a:noFill/>
+                    </a:lnBlToTr>
+                    <a:noFill/>
+                  </a:tcPr>
+                </a:tc>
+                <a:tc>
+                  <a:txBody>
+                    <a:bodyPr/>
+                    <a:p>
+                      <a:pPr indent="0" algn="ctr">
+                        <a:buNone/>
+                      </a:pPr>
+                      <a:r>
+                        <a:rPr lang="en-US" sz="2400" b="0">
+                          <a:latin typeface="Calibri" panose="020F0502020204030204" charset="0"/>
+                          <a:cs typeface="Calibri" panose="020F0502020204030204" charset="0"/>
+                        </a:rPr>
+                        <a:t>40%</a:t>
+                      </a:r>
+                      <a:endParaRPr lang="en-US" altLang="en-US" sz="2400" b="0">
+                        <a:latin typeface="Calibri" panose="020F0502020204030204" charset="0"/>
+                        <a:ea typeface="Calibri" panose="020F0502020204030204" charset="0"/>
+                        <a:cs typeface="Calibri" panose="020F0502020204030204" charset="0"/>
+                      </a:endParaRPr>
+                    </a:p>
+                  </a:txBody>
+                  <a:tcPr marL="68580" marR="68580" marT="0" marB="0" vert="horz" anchor="t" anchorCtr="0">
+                    <a:lnL w="19050">
+                      <a:solidFill>
+                        <a:schemeClr val="tx1"/>
+                      </a:solidFill>
+                      <a:prstDash val="solid"/>
+                    </a:lnL>
+                    <a:lnR w="19050">
+                      <a:solidFill>
+                        <a:schemeClr val="tx1"/>
+                      </a:solidFill>
+                      <a:prstDash val="solid"/>
+                    </a:lnR>
+                    <a:lnT w="19050">
+                      <a:solidFill>
+                        <a:schemeClr val="tx1"/>
+                      </a:solidFill>
+                      <a:prstDash val="solid"/>
+                    </a:lnT>
+                    <a:lnB w="19050">
+                      <a:solidFill>
+                        <a:schemeClr val="tx1"/>
+                      </a:solidFill>
+                      <a:prstDash val="solid"/>
+                    </a:lnB>
+                    <a:lnTlToBr>
+                      <a:noFill/>
+                    </a:lnTlToBr>
+                    <a:lnBlToTr>
+                      <a:noFill/>
+                    </a:lnBlToTr>
+                    <a:noFill/>
+                  </a:tcPr>
+                </a:tc>
+              </a:tr>
+              <a:tr h="346710">
+                <a:tc>
+                  <a:txBody>
+                    <a:bodyPr/>
+                    <a:p>
+                      <a:pPr indent="0">
+                        <a:buNone/>
+                      </a:pPr>
+                      <a:r>
+                        <a:rPr lang="en-US" sz="2400" b="0">
+                          <a:latin typeface="Calibri" panose="020F0502020204030204" charset="0"/>
+                          <a:cs typeface="Calibri" panose="020F0502020204030204" charset="0"/>
+                        </a:rPr>
+                        <a:t>Assiduidade e participação</a:t>
+                      </a:r>
+                      <a:endParaRPr lang="en-US" altLang="en-US" sz="2400" b="0">
+                        <a:latin typeface="Calibri" panose="020F0502020204030204" charset="0"/>
+                        <a:ea typeface="Calibri" panose="020F0502020204030204" charset="0"/>
+                        <a:cs typeface="Calibri" panose="020F0502020204030204" charset="0"/>
+                      </a:endParaRPr>
+                    </a:p>
+                  </a:txBody>
+                  <a:tcPr marL="68580" marR="68580" marT="0" marB="0" vert="horz" anchor="t" anchorCtr="0">
+                    <a:lnL w="19050">
+                      <a:solidFill>
+                        <a:schemeClr val="tx1"/>
+                      </a:solidFill>
+                      <a:prstDash val="solid"/>
+                    </a:lnL>
+                    <a:lnR w="19050">
+                      <a:solidFill>
+                        <a:schemeClr val="tx1"/>
+                      </a:solidFill>
+                      <a:prstDash val="solid"/>
+                    </a:lnR>
+                    <a:lnT w="19050">
+                      <a:solidFill>
+                        <a:schemeClr val="tx1"/>
+                      </a:solidFill>
+                      <a:prstDash val="solid"/>
+                    </a:lnT>
+                    <a:lnB w="19050">
+                      <a:solidFill>
+                        <a:schemeClr val="tx1"/>
+                      </a:solidFill>
+                      <a:prstDash val="solid"/>
+                    </a:lnB>
+                    <a:lnTlToBr>
+                      <a:noFill/>
+                    </a:lnTlToBr>
+                    <a:lnBlToTr>
+                      <a:noFill/>
+                    </a:lnBlToTr>
+                    <a:noFill/>
+                  </a:tcPr>
+                </a:tc>
+                <a:tc>
+                  <a:txBody>
+                    <a:bodyPr/>
+                    <a:p>
+                      <a:pPr indent="0" algn="ctr">
+                        <a:buNone/>
+                      </a:pPr>
+                      <a:r>
+                        <a:rPr lang="en-US" sz="2400" b="0">
+                          <a:latin typeface="Calibri" panose="020F0502020204030204" charset="0"/>
+                          <a:cs typeface="Calibri" panose="020F0502020204030204" charset="0"/>
+                        </a:rPr>
+                        <a:t>10%</a:t>
+                      </a:r>
+                      <a:endParaRPr lang="en-US" altLang="en-US" sz="2400" b="0">
+                        <a:latin typeface="Calibri" panose="020F0502020204030204" charset="0"/>
+                        <a:ea typeface="Calibri" panose="020F0502020204030204" charset="0"/>
+                        <a:cs typeface="Calibri" panose="020F0502020204030204" charset="0"/>
+                      </a:endParaRPr>
+                    </a:p>
+                  </a:txBody>
+                  <a:tcPr marL="68580" marR="68580" marT="0" marB="0" vert="horz" anchor="t" anchorCtr="0">
+                    <a:lnL w="19050">
+                      <a:solidFill>
+                        <a:schemeClr val="tx1"/>
+                      </a:solidFill>
+                      <a:prstDash val="solid"/>
+                    </a:lnL>
+                    <a:lnR w="19050">
+                      <a:solidFill>
+                        <a:schemeClr val="tx1"/>
+                      </a:solidFill>
+                      <a:prstDash val="solid"/>
+                    </a:lnR>
+                    <a:lnT w="19050">
+                      <a:solidFill>
+                        <a:schemeClr val="tx1"/>
+                      </a:solidFill>
+                      <a:prstDash val="solid"/>
+                    </a:lnT>
+                    <a:lnB w="19050">
+                      <a:solidFill>
+                        <a:schemeClr val="tx1"/>
+                      </a:solidFill>
+                      <a:prstDash val="solid"/>
+                    </a:lnB>
+                    <a:lnTlToBr>
+                      <a:noFill/>
+                    </a:lnTlToBr>
+                    <a:lnBlToTr>
+                      <a:noFill/>
+                    </a:lnBlToTr>
+                    <a:noFill/>
+                  </a:tcPr>
+                </a:tc>
+              </a:tr>
+            </a:tbl>
+          </a:graphicData>
+        </a:graphic>
+      </p:graphicFrame>
     </p:spTree>
   </p:cSld>
   <p:clrMapOvr>
@@ -3283,6 +3733,383 @@
 </file>
 
 <file path=ppt/slides/slide3.xml><?xml version="1.0" encoding="utf-8"?>
+<p:sld xmlns:a="http://schemas.openxmlformats.org/drawingml/2006/main" xmlns:r="http://schemas.openxmlformats.org/officeDocument/2006/relationships" xmlns:p="http://schemas.openxmlformats.org/presentationml/2006/main">
+  <p:cSld>
+    <p:spTree>
+      <p:nvGrpSpPr>
+        <p:cNvPr id="1" name=""/>
+        <p:cNvGrpSpPr/>
+        <p:nvPr/>
+      </p:nvGrpSpPr>
+      <p:grpSpPr/>
+      <p:sp>
+        <p:nvSpPr>
+          <p:cNvPr id="2" name="Título 1"/>
+          <p:cNvSpPr>
+            <a:spLocks noGrp="1"/>
+          </p:cNvSpPr>
+          <p:nvPr>
+            <p:ph type="title"/>
+          </p:nvPr>
+        </p:nvSpPr>
+        <p:spPr/>
+        <p:txBody>
+          <a:bodyPr>
+            <a:normAutofit fontScale="90000"/>
+          </a:bodyPr>
+          <a:p>
+            <a:r>
+              <a:rPr lang="pt-BR" altLang="en-US"/>
+              <a:t>Integridade dos trabalhos escolares</a:t>
+            </a:r>
+            <a:endParaRPr lang="pt-BR" altLang="en-US"/>
+          </a:p>
+        </p:txBody>
+      </p:sp>
+      <p:sp>
+        <p:nvSpPr>
+          <p:cNvPr id="3" name="Espaço Reservado para Conteúdo 2"/>
+          <p:cNvSpPr>
+            <a:spLocks noGrp="1"/>
+          </p:cNvSpPr>
+          <p:nvPr>
+            <p:ph idx="1"/>
+          </p:nvPr>
+        </p:nvSpPr>
+        <p:spPr/>
+        <p:txBody>
+          <a:bodyPr>
+            <a:normAutofit fontScale="80000"/>
+          </a:bodyPr>
+          <a:p>
+            <a:pPr algn="just"/>
+            <a:r>
+              <a:rPr lang="pt-BR" altLang="en-US"/>
+              <a:t>Todas as atividades devem ser de própria autoria. Caso seja necessário o uso de figuras, tabelas, estruturas e ideias, apresente as fontes utilizadas. Qualquer infração neste sentido (cópia de atividades), em Exercícios e atividades e Atividades de laboratório, serão penalizadas com nota zero. Política de tolerância zero;</a:t>
+            </a:r>
+            <a:endParaRPr lang="pt-BR" altLang="en-US"/>
+          </a:p>
+          <a:p>
+            <a:pPr algn="just"/>
+            <a:r>
+              <a:rPr lang="pt-BR" altLang="en-US"/>
+              <a:t>As consequências previstas na  Resolução 04/2004 da UFCG (Regimento Geral da UFCG) Art. 153 são:</a:t>
+            </a:r>
+            <a:endParaRPr lang="pt-BR" altLang="en-US"/>
+          </a:p>
+          <a:p>
+            <a:pPr marL="0" indent="0" algn="just">
+              <a:buNone/>
+            </a:pPr>
+            <a:r>
+              <a:rPr lang="pt-BR" altLang="en-US" i="1"/>
+              <a:t>III – suspensão de até 15 (quinze) dias na reincidência das infrações previstas no inciso II deste artigo ou:</a:t>
+            </a:r>
+            <a:endParaRPr lang="pt-BR" altLang="en-US" i="1"/>
+          </a:p>
+          <a:p>
+            <a:pPr marL="0" indent="0" algn="just">
+              <a:buNone/>
+            </a:pPr>
+            <a:r>
+              <a:rPr lang="pt-BR" altLang="en-US" i="1"/>
+              <a:t>a) por agressão a qualquer membro da comunidade universitária;</a:t>
+            </a:r>
+            <a:endParaRPr lang="pt-BR" altLang="en-US" i="1"/>
+          </a:p>
+          <a:p>
+            <a:pPr marL="0" indent="0" algn="just">
+              <a:buNone/>
+            </a:pPr>
+            <a:r>
+              <a:rPr lang="pt-BR" altLang="en-US" b="1" i="1">
+                <a:solidFill>
+                  <a:srgbClr val="FF0000"/>
+                </a:solidFill>
+              </a:rPr>
+              <a:t>b) por improbidade na execução dos trabalhos escolares;</a:t>
+            </a:r>
+            <a:endParaRPr lang="pt-BR" altLang="en-US" b="1" i="1">
+              <a:solidFill>
+                <a:srgbClr val="FF0000"/>
+              </a:solidFill>
+            </a:endParaRPr>
+          </a:p>
+        </p:txBody>
+      </p:sp>
+    </p:spTree>
+  </p:cSld>
+  <p:clrMapOvr>
+    <a:masterClrMapping/>
+  </p:clrMapOvr>
+</p:sld>
+</file>
+
+<file path=ppt/slides/slide4.xml><?xml version="1.0" encoding="utf-8"?>
+<p:sld xmlns:a="http://schemas.openxmlformats.org/drawingml/2006/main" xmlns:r="http://schemas.openxmlformats.org/officeDocument/2006/relationships" xmlns:p="http://schemas.openxmlformats.org/presentationml/2006/main">
+  <p:cSld>
+    <p:spTree>
+      <p:nvGrpSpPr>
+        <p:cNvPr id="1" name=""/>
+        <p:cNvGrpSpPr/>
+        <p:nvPr/>
+      </p:nvGrpSpPr>
+      <p:grpSpPr/>
+      <p:sp>
+        <p:nvSpPr>
+          <p:cNvPr id="2" name="Título 1"/>
+          <p:cNvSpPr>
+            <a:spLocks noGrp="1"/>
+          </p:cNvSpPr>
+          <p:nvPr>
+            <p:ph type="title"/>
+          </p:nvPr>
+        </p:nvSpPr>
+        <p:spPr/>
+        <p:txBody>
+          <a:bodyPr/>
+          <a:p>
+            <a:r>
+              <a:rPr lang="pt-BR" altLang="en-US"/>
+              <a:t>Obetivos</a:t>
+            </a:r>
+            <a:endParaRPr lang="pt-BR" altLang="en-US"/>
+          </a:p>
+        </p:txBody>
+      </p:sp>
+      <p:sp>
+        <p:nvSpPr>
+          <p:cNvPr id="3" name="Espaço Reservado para Conteúdo 2"/>
+          <p:cNvSpPr>
+            <a:spLocks noGrp="1"/>
+          </p:cNvSpPr>
+          <p:nvPr>
+            <p:ph idx="1"/>
+          </p:nvPr>
+        </p:nvSpPr>
+        <p:spPr/>
+        <p:txBody>
+          <a:bodyPr>
+            <a:normAutofit fontScale="90000" lnSpcReduction="20000"/>
+          </a:bodyPr>
+          <a:p>
+            <a:pPr marL="457200" indent="-457200" algn="just">
+              <a:buAutoNum type="arabicPeriod"/>
+            </a:pPr>
+            <a:r>
+              <a:rPr lang="pt-BR" altLang="en-US"/>
+              <a:t>Aprender os conceitos fundamentais e os princípios de operação e dispositivos e circuitos fotônicos em silício;</a:t>
+            </a:r>
+            <a:endParaRPr lang="pt-BR" altLang="en-US"/>
+          </a:p>
+          <a:p>
+            <a:pPr marL="457200" indent="-457200" algn="just">
+              <a:buAutoNum type="arabicPeriod"/>
+            </a:pPr>
+            <a:r>
+              <a:rPr lang="pt-BR" altLang="en-US"/>
+              <a:t>Avaliar, analisar e projetar dispositivos passivos primários;</a:t>
+            </a:r>
+            <a:endParaRPr lang="pt-BR" altLang="en-US"/>
+          </a:p>
+          <a:p>
+            <a:pPr marL="457200" indent="-457200" algn="just">
+              <a:buAutoNum type="arabicPeriod"/>
+            </a:pPr>
+            <a:r>
+              <a:rPr lang="pt-BR" altLang="en-US"/>
+              <a:t>Avaliar, analisar e projetar circuitos fotônicos integrados em silício;</a:t>
+            </a:r>
+            <a:endParaRPr lang="pt-BR" altLang="en-US"/>
+          </a:p>
+          <a:p>
+            <a:pPr marL="457200" indent="-457200" algn="just">
+              <a:buAutoNum type="arabicPeriod"/>
+            </a:pPr>
+            <a:r>
+              <a:rPr lang="pt-BR" altLang="en-US"/>
+              <a:t>Trabalhar e simular com as ferramentas Lumerical - Ansys para fotônica em silício;</a:t>
+            </a:r>
+            <a:endParaRPr lang="pt-BR" altLang="en-US"/>
+          </a:p>
+          <a:p>
+            <a:pPr marL="457200" indent="-457200" algn="just">
+              <a:buAutoNum type="arabicPeriod"/>
+            </a:pPr>
+            <a:r>
+              <a:rPr lang="pt-BR" altLang="en-US"/>
+              <a:t>Utilizar o Klayout para projeto e verificação de circuitos fotônicos;</a:t>
+            </a:r>
+            <a:endParaRPr lang="pt-BR" altLang="en-US"/>
+          </a:p>
+          <a:p>
+            <a:pPr marL="457200" indent="-457200" algn="just">
+              <a:buAutoNum type="arabicPeriod"/>
+            </a:pPr>
+            <a:r>
+              <a:rPr lang="pt-BR" altLang="en-US"/>
+              <a:t>Explorar aplicações de fotônica em silício para aplicação em sensores e datacom, considerando algumas métricas de desempenho, desafios e oportunidades.</a:t>
+            </a:r>
+            <a:endParaRPr lang="pt-BR" altLang="en-US"/>
+          </a:p>
+        </p:txBody>
+      </p:sp>
+    </p:spTree>
+  </p:cSld>
+  <p:clrMapOvr>
+    <a:masterClrMapping/>
+  </p:clrMapOvr>
+</p:sld>
+</file>
+
+<file path=ppt/slides/slide5.xml><?xml version="1.0" encoding="utf-8"?>
+<p:sld xmlns:a="http://schemas.openxmlformats.org/drawingml/2006/main" xmlns:r="http://schemas.openxmlformats.org/officeDocument/2006/relationships" xmlns:p="http://schemas.openxmlformats.org/presentationml/2006/main">
+  <p:cSld>
+    <p:spTree>
+      <p:nvGrpSpPr>
+        <p:cNvPr id="1" name=""/>
+        <p:cNvGrpSpPr/>
+        <p:nvPr/>
+      </p:nvGrpSpPr>
+      <p:grpSpPr/>
+      <p:sp>
+        <p:nvSpPr>
+          <p:cNvPr id="2" name="Título 1"/>
+          <p:cNvSpPr>
+            <a:spLocks noGrp="1"/>
+          </p:cNvSpPr>
+          <p:nvPr>
+            <p:ph type="title"/>
+          </p:nvPr>
+        </p:nvSpPr>
+        <p:spPr/>
+        <p:txBody>
+          <a:bodyPr/>
+          <a:p>
+            <a:r>
+              <a:rPr lang="pt-BR" altLang="en-US"/>
+              <a:t>Habilidades desenvolvidas</a:t>
+            </a:r>
+            <a:endParaRPr lang="pt-BR" altLang="en-US"/>
+          </a:p>
+        </p:txBody>
+      </p:sp>
+      <p:sp>
+        <p:nvSpPr>
+          <p:cNvPr id="3" name="Espaço Reservado para Conteúdo 2"/>
+          <p:cNvSpPr>
+            <a:spLocks noGrp="1"/>
+          </p:cNvSpPr>
+          <p:nvPr>
+            <p:ph idx="1"/>
+          </p:nvPr>
+        </p:nvSpPr>
+        <p:spPr/>
+        <p:txBody>
+          <a:bodyPr>
+            <a:normAutofit fontScale="50000"/>
+          </a:bodyPr>
+          <a:p>
+            <a:pPr marL="342900" indent="-342900">
+              <a:buAutoNum type="arabicPeriod"/>
+            </a:pPr>
+            <a:r>
+              <a:rPr lang="pt-BR" altLang="en-US"/>
+              <a:t>Entender o principio da reflexão interna total e suas consequências para transmissão e reflexão de ondas;</a:t>
+            </a:r>
+            <a:endParaRPr lang="pt-BR" altLang="en-US"/>
+          </a:p>
+          <a:p>
+            <a:pPr marL="342900" indent="-342900">
+              <a:buAutoNum type="arabicPeriod"/>
+            </a:pPr>
+            <a:r>
+              <a:rPr lang="pt-BR" altLang="en-US"/>
+              <a:t>Determinar expressões analíticas para os campos eletromagnéticos e condições de guiamento em guias dielétricos simétricos;</a:t>
+            </a:r>
+            <a:endParaRPr lang="pt-BR" altLang="en-US"/>
+          </a:p>
+          <a:p>
+            <a:pPr marL="342900" indent="-342900">
+              <a:buAutoNum type="arabicPeriod"/>
+            </a:pPr>
+            <a:r>
+              <a:rPr lang="pt-BR" altLang="en-US"/>
+              <a:t>Calcular a constante de propagação, o índice efetivo e o fator de confinamento óptico para um determinado modo óptico guiante em um guia dielétrico;</a:t>
+            </a:r>
+            <a:endParaRPr lang="pt-BR" altLang="en-US"/>
+          </a:p>
+          <a:p>
+            <a:pPr marL="342900" indent="-342900">
+              <a:buAutoNum type="arabicPeriod"/>
+            </a:pPr>
+            <a:r>
+              <a:rPr lang="pt-BR" altLang="en-US"/>
+              <a:t>Encontrar as condições de corte, a frequência de corte e as soluções gerais para os modos TE e TM em guias dielétricos assimétricos; </a:t>
+            </a:r>
+            <a:endParaRPr lang="pt-BR" altLang="en-US"/>
+          </a:p>
+          <a:p>
+            <a:pPr marL="342900" indent="-342900">
+              <a:buAutoNum type="arabicPeriod"/>
+            </a:pPr>
+            <a:r>
+              <a:rPr lang="pt-BR" altLang="en-US"/>
+              <a:t>Encontrar a condição de guiamento e as soluções gerais para os modos em um guia dielétrico retangular utilizando o método do índice efetivo; </a:t>
+            </a:r>
+            <a:endParaRPr lang="pt-BR" altLang="en-US"/>
+          </a:p>
+          <a:p>
+            <a:pPr marL="342900" indent="-342900">
+              <a:buAutoNum type="arabicPeriod"/>
+            </a:pPr>
+            <a:r>
+              <a:rPr lang="pt-BR" altLang="en-US"/>
+              <a:t>Aplicar o teorema dos modos acoplados para calcular a troca de potências em guias ópticos acoplados; </a:t>
+            </a:r>
+            <a:endParaRPr lang="pt-BR" altLang="en-US"/>
+          </a:p>
+          <a:p>
+            <a:pPr marL="342900" indent="-342900">
+              <a:buAutoNum type="arabicPeriod"/>
+            </a:pPr>
+            <a:r>
+              <a:rPr lang="pt-BR" altLang="en-US"/>
+              <a:t>Entender os princípios da multiplexação por comprimento de onda (Wavelength Division Multiplexing - WDM) em comunicações ópticas; </a:t>
+            </a:r>
+            <a:endParaRPr lang="pt-BR" altLang="en-US"/>
+          </a:p>
+          <a:p>
+            <a:pPr marL="342900" indent="-342900">
+              <a:buAutoNum type="arabicPeriod"/>
+            </a:pPr>
+            <a:r>
+              <a:rPr lang="pt-BR" altLang="en-US"/>
+              <a:t>Projetar e analisar interferômetros de Mach-Zehnder (Mach-Zehnder Interferometer - MZI), filtros em cascata (MZI) e acopladores em estrela; </a:t>
+            </a:r>
+            <a:endParaRPr lang="pt-BR" altLang="en-US"/>
+          </a:p>
+          <a:p>
+            <a:pPr marL="342900" indent="-342900">
+              <a:buAutoNum type="arabicPeriod"/>
+            </a:pPr>
+            <a:r>
+              <a:rPr lang="pt-BR" altLang="en-US"/>
+              <a:t>Projetar e analisar anéis de ressonância ópticos, acopladores ópticos e filtros add-drop; </a:t>
+            </a:r>
+            <a:endParaRPr lang="pt-BR" altLang="en-US"/>
+          </a:p>
+        </p:txBody>
+      </p:sp>
+    </p:spTree>
+  </p:cSld>
+  <p:clrMapOvr>
+    <a:masterClrMapping/>
+  </p:clrMapOvr>
+</p:sld>
+</file>
+
+<file path=ppt/slides/slide6.xml><?xml version="1.0" encoding="utf-8"?>
 <p:sld xmlns:a="http://schemas.openxmlformats.org/drawingml/2006/main" xmlns:r="http://schemas.openxmlformats.org/officeDocument/2006/relationships" xmlns:p="http://schemas.openxmlformats.org/presentationml/2006/main">
   <p:cSld>
     <p:spTree>

</xml_diff>